<commit_message>
Atualização da documentação de planejamento e da Apresentação do PGPS.
</commit_message>
<xml_diff>
--- a/Documentação/Planejamento/Apresentação.pptx
+++ b/Documentação/Planejamento/Apresentação.pptx
@@ -5,7 +5,7 @@
     <p:sldMasterId id="2147483864" r:id="rId1"/>
   </p:sldMasterIdLst>
   <p:notesMasterIdLst>
-    <p:notesMasterId r:id="rId8"/>
+    <p:notesMasterId r:id="rId17"/>
   </p:notesMasterIdLst>
   <p:sldIdLst>
     <p:sldId id="256" r:id="rId2"/>
@@ -14,6 +14,15 @@
     <p:sldId id="259" r:id="rId5"/>
     <p:sldId id="260" r:id="rId6"/>
     <p:sldId id="261" r:id="rId7"/>
+    <p:sldId id="263" r:id="rId8"/>
+    <p:sldId id="264" r:id="rId9"/>
+    <p:sldId id="265" r:id="rId10"/>
+    <p:sldId id="268" r:id="rId11"/>
+    <p:sldId id="262" r:id="rId12"/>
+    <p:sldId id="266" r:id="rId13"/>
+    <p:sldId id="267" r:id="rId14"/>
+    <p:sldId id="269" r:id="rId15"/>
+    <p:sldId id="270" r:id="rId16"/>
   </p:sldIdLst>
   <p:sldSz cx="9144000" cy="6858000" type="screen4x3"/>
   <p:notesSz cx="6858000" cy="9144000"/>
@@ -543,6 +552,492 @@
 </p:notes>
 </file>
 
+<file path=ppt/notesSlides/notesSlide10.xml><?xml version="1.0" encoding="utf-8"?>
+<p:notes xmlns:a="http://schemas.openxmlformats.org/drawingml/2006/main" xmlns:r="http://schemas.openxmlformats.org/officeDocument/2006/relationships" xmlns:p="http://schemas.openxmlformats.org/presentationml/2006/main">
+  <p:cSld>
+    <p:spTree>
+      <p:nvGrpSpPr>
+        <p:cNvPr id="1" name=""/>
+        <p:cNvGrpSpPr/>
+        <p:nvPr/>
+      </p:nvGrpSpPr>
+      <p:grpSpPr>
+        <a:xfrm>
+          <a:off x="0" y="0"/>
+          <a:ext cx="0" cy="0"/>
+          <a:chOff x="0" y="0"/>
+          <a:chExt cx="0" cy="0"/>
+        </a:xfrm>
+      </p:grpSpPr>
+      <p:sp>
+        <p:nvSpPr>
+          <p:cNvPr id="2" name="Espaço Reservado para Imagem de Slide 1"/>
+          <p:cNvSpPr>
+            <a:spLocks noGrp="1" noRot="1" noChangeAspect="1"/>
+          </p:cNvSpPr>
+          <p:nvPr>
+            <p:ph type="sldImg"/>
+          </p:nvPr>
+        </p:nvSpPr>
+        <p:spPr/>
+      </p:sp>
+      <p:sp>
+        <p:nvSpPr>
+          <p:cNvPr id="3" name="Espaço Reservado para Anotações 2"/>
+          <p:cNvSpPr>
+            <a:spLocks noGrp="1"/>
+          </p:cNvSpPr>
+          <p:nvPr>
+            <p:ph type="body" idx="1"/>
+          </p:nvPr>
+        </p:nvSpPr>
+        <p:spPr/>
+        <p:txBody>
+          <a:bodyPr>
+            <a:normAutofit/>
+          </a:bodyPr>
+          <a:lstStyle/>
+          <a:p>
+            <a:endParaRPr lang="pt-BR"/>
+          </a:p>
+        </p:txBody>
+      </p:sp>
+      <p:sp>
+        <p:nvSpPr>
+          <p:cNvPr id="4" name="Espaço Reservado para Número de Slide 3"/>
+          <p:cNvSpPr>
+            <a:spLocks noGrp="1"/>
+          </p:cNvSpPr>
+          <p:nvPr>
+            <p:ph type="sldNum" sz="quarter" idx="10"/>
+          </p:nvPr>
+        </p:nvSpPr>
+        <p:spPr/>
+        <p:txBody>
+          <a:bodyPr/>
+          <a:lstStyle/>
+          <a:p>
+            <a:fld id="{EBBBFCE1-D48B-48F0-9862-9677497DA945}" type="slidenum">
+              <a:rPr lang="pt-BR" smtClean="0"/>
+              <a:t>10</a:t>
+            </a:fld>
+            <a:endParaRPr lang="pt-BR"/>
+          </a:p>
+        </p:txBody>
+      </p:sp>
+    </p:spTree>
+  </p:cSld>
+  <p:clrMapOvr>
+    <a:masterClrMapping/>
+  </p:clrMapOvr>
+</p:notes>
+</file>
+
+<file path=ppt/notesSlides/notesSlide11.xml><?xml version="1.0" encoding="utf-8"?>
+<p:notes xmlns:a="http://schemas.openxmlformats.org/drawingml/2006/main" xmlns:r="http://schemas.openxmlformats.org/officeDocument/2006/relationships" xmlns:p="http://schemas.openxmlformats.org/presentationml/2006/main">
+  <p:cSld>
+    <p:spTree>
+      <p:nvGrpSpPr>
+        <p:cNvPr id="1" name=""/>
+        <p:cNvGrpSpPr/>
+        <p:nvPr/>
+      </p:nvGrpSpPr>
+      <p:grpSpPr>
+        <a:xfrm>
+          <a:off x="0" y="0"/>
+          <a:ext cx="0" cy="0"/>
+          <a:chOff x="0" y="0"/>
+          <a:chExt cx="0" cy="0"/>
+        </a:xfrm>
+      </p:grpSpPr>
+      <p:sp>
+        <p:nvSpPr>
+          <p:cNvPr id="2" name="Espaço Reservado para Imagem de Slide 1"/>
+          <p:cNvSpPr>
+            <a:spLocks noGrp="1" noRot="1" noChangeAspect="1"/>
+          </p:cNvSpPr>
+          <p:nvPr>
+            <p:ph type="sldImg"/>
+          </p:nvPr>
+        </p:nvSpPr>
+        <p:spPr/>
+      </p:sp>
+      <p:sp>
+        <p:nvSpPr>
+          <p:cNvPr id="3" name="Espaço Reservado para Anotações 2"/>
+          <p:cNvSpPr>
+            <a:spLocks noGrp="1"/>
+          </p:cNvSpPr>
+          <p:nvPr>
+            <p:ph type="body" idx="1"/>
+          </p:nvPr>
+        </p:nvSpPr>
+        <p:spPr/>
+        <p:txBody>
+          <a:bodyPr>
+            <a:normAutofit/>
+          </a:bodyPr>
+          <a:lstStyle/>
+          <a:p>
+            <a:endParaRPr lang="pt-BR"/>
+          </a:p>
+        </p:txBody>
+      </p:sp>
+      <p:sp>
+        <p:nvSpPr>
+          <p:cNvPr id="4" name="Espaço Reservado para Número de Slide 3"/>
+          <p:cNvSpPr>
+            <a:spLocks noGrp="1"/>
+          </p:cNvSpPr>
+          <p:nvPr>
+            <p:ph type="sldNum" sz="quarter" idx="10"/>
+          </p:nvPr>
+        </p:nvSpPr>
+        <p:spPr/>
+        <p:txBody>
+          <a:bodyPr/>
+          <a:lstStyle/>
+          <a:p>
+            <a:fld id="{EBBBFCE1-D48B-48F0-9862-9677497DA945}" type="slidenum">
+              <a:rPr lang="pt-BR" smtClean="0"/>
+              <a:t>11</a:t>
+            </a:fld>
+            <a:endParaRPr lang="pt-BR"/>
+          </a:p>
+        </p:txBody>
+      </p:sp>
+    </p:spTree>
+  </p:cSld>
+  <p:clrMapOvr>
+    <a:masterClrMapping/>
+  </p:clrMapOvr>
+</p:notes>
+</file>
+
+<file path=ppt/notesSlides/notesSlide12.xml><?xml version="1.0" encoding="utf-8"?>
+<p:notes xmlns:a="http://schemas.openxmlformats.org/drawingml/2006/main" xmlns:r="http://schemas.openxmlformats.org/officeDocument/2006/relationships" xmlns:p="http://schemas.openxmlformats.org/presentationml/2006/main">
+  <p:cSld>
+    <p:spTree>
+      <p:nvGrpSpPr>
+        <p:cNvPr id="1" name=""/>
+        <p:cNvGrpSpPr/>
+        <p:nvPr/>
+      </p:nvGrpSpPr>
+      <p:grpSpPr>
+        <a:xfrm>
+          <a:off x="0" y="0"/>
+          <a:ext cx="0" cy="0"/>
+          <a:chOff x="0" y="0"/>
+          <a:chExt cx="0" cy="0"/>
+        </a:xfrm>
+      </p:grpSpPr>
+      <p:sp>
+        <p:nvSpPr>
+          <p:cNvPr id="2" name="Espaço Reservado para Imagem de Slide 1"/>
+          <p:cNvSpPr>
+            <a:spLocks noGrp="1" noRot="1" noChangeAspect="1"/>
+          </p:cNvSpPr>
+          <p:nvPr>
+            <p:ph type="sldImg"/>
+          </p:nvPr>
+        </p:nvSpPr>
+        <p:spPr/>
+      </p:sp>
+      <p:sp>
+        <p:nvSpPr>
+          <p:cNvPr id="3" name="Espaço Reservado para Anotações 2"/>
+          <p:cNvSpPr>
+            <a:spLocks noGrp="1"/>
+          </p:cNvSpPr>
+          <p:nvPr>
+            <p:ph type="body" idx="1"/>
+          </p:nvPr>
+        </p:nvSpPr>
+        <p:spPr/>
+        <p:txBody>
+          <a:bodyPr>
+            <a:normAutofit/>
+          </a:bodyPr>
+          <a:lstStyle/>
+          <a:p>
+            <a:endParaRPr lang="pt-BR"/>
+          </a:p>
+        </p:txBody>
+      </p:sp>
+      <p:sp>
+        <p:nvSpPr>
+          <p:cNvPr id="4" name="Espaço Reservado para Número de Slide 3"/>
+          <p:cNvSpPr>
+            <a:spLocks noGrp="1"/>
+          </p:cNvSpPr>
+          <p:nvPr>
+            <p:ph type="sldNum" sz="quarter" idx="10"/>
+          </p:nvPr>
+        </p:nvSpPr>
+        <p:spPr/>
+        <p:txBody>
+          <a:bodyPr/>
+          <a:lstStyle/>
+          <a:p>
+            <a:fld id="{EBBBFCE1-D48B-48F0-9862-9677497DA945}" type="slidenum">
+              <a:rPr lang="pt-BR" smtClean="0"/>
+              <a:t>12</a:t>
+            </a:fld>
+            <a:endParaRPr lang="pt-BR"/>
+          </a:p>
+        </p:txBody>
+      </p:sp>
+    </p:spTree>
+  </p:cSld>
+  <p:clrMapOvr>
+    <a:masterClrMapping/>
+  </p:clrMapOvr>
+</p:notes>
+</file>
+
+<file path=ppt/notesSlides/notesSlide13.xml><?xml version="1.0" encoding="utf-8"?>
+<p:notes xmlns:a="http://schemas.openxmlformats.org/drawingml/2006/main" xmlns:r="http://schemas.openxmlformats.org/officeDocument/2006/relationships" xmlns:p="http://schemas.openxmlformats.org/presentationml/2006/main">
+  <p:cSld>
+    <p:spTree>
+      <p:nvGrpSpPr>
+        <p:cNvPr id="1" name=""/>
+        <p:cNvGrpSpPr/>
+        <p:nvPr/>
+      </p:nvGrpSpPr>
+      <p:grpSpPr>
+        <a:xfrm>
+          <a:off x="0" y="0"/>
+          <a:ext cx="0" cy="0"/>
+          <a:chOff x="0" y="0"/>
+          <a:chExt cx="0" cy="0"/>
+        </a:xfrm>
+      </p:grpSpPr>
+      <p:sp>
+        <p:nvSpPr>
+          <p:cNvPr id="2" name="Espaço Reservado para Imagem de Slide 1"/>
+          <p:cNvSpPr>
+            <a:spLocks noGrp="1" noRot="1" noChangeAspect="1"/>
+          </p:cNvSpPr>
+          <p:nvPr>
+            <p:ph type="sldImg"/>
+          </p:nvPr>
+        </p:nvSpPr>
+        <p:spPr/>
+      </p:sp>
+      <p:sp>
+        <p:nvSpPr>
+          <p:cNvPr id="3" name="Espaço Reservado para Anotações 2"/>
+          <p:cNvSpPr>
+            <a:spLocks noGrp="1"/>
+          </p:cNvSpPr>
+          <p:nvPr>
+            <p:ph type="body" idx="1"/>
+          </p:nvPr>
+        </p:nvSpPr>
+        <p:spPr/>
+        <p:txBody>
+          <a:bodyPr>
+            <a:normAutofit/>
+          </a:bodyPr>
+          <a:lstStyle/>
+          <a:p>
+            <a:endParaRPr lang="pt-BR"/>
+          </a:p>
+        </p:txBody>
+      </p:sp>
+      <p:sp>
+        <p:nvSpPr>
+          <p:cNvPr id="4" name="Espaço Reservado para Número de Slide 3"/>
+          <p:cNvSpPr>
+            <a:spLocks noGrp="1"/>
+          </p:cNvSpPr>
+          <p:nvPr>
+            <p:ph type="sldNum" sz="quarter" idx="10"/>
+          </p:nvPr>
+        </p:nvSpPr>
+        <p:spPr/>
+        <p:txBody>
+          <a:bodyPr/>
+          <a:lstStyle/>
+          <a:p>
+            <a:fld id="{EBBBFCE1-D48B-48F0-9862-9677497DA945}" type="slidenum">
+              <a:rPr lang="pt-BR" smtClean="0"/>
+              <a:t>13</a:t>
+            </a:fld>
+            <a:endParaRPr lang="pt-BR"/>
+          </a:p>
+        </p:txBody>
+      </p:sp>
+    </p:spTree>
+  </p:cSld>
+  <p:clrMapOvr>
+    <a:masterClrMapping/>
+  </p:clrMapOvr>
+</p:notes>
+</file>
+
+<file path=ppt/notesSlides/notesSlide14.xml><?xml version="1.0" encoding="utf-8"?>
+<p:notes xmlns:a="http://schemas.openxmlformats.org/drawingml/2006/main" xmlns:r="http://schemas.openxmlformats.org/officeDocument/2006/relationships" xmlns:p="http://schemas.openxmlformats.org/presentationml/2006/main">
+  <p:cSld>
+    <p:spTree>
+      <p:nvGrpSpPr>
+        <p:cNvPr id="1" name=""/>
+        <p:cNvGrpSpPr/>
+        <p:nvPr/>
+      </p:nvGrpSpPr>
+      <p:grpSpPr>
+        <a:xfrm>
+          <a:off x="0" y="0"/>
+          <a:ext cx="0" cy="0"/>
+          <a:chOff x="0" y="0"/>
+          <a:chExt cx="0" cy="0"/>
+        </a:xfrm>
+      </p:grpSpPr>
+      <p:sp>
+        <p:nvSpPr>
+          <p:cNvPr id="2" name="Espaço Reservado para Imagem de Slide 1"/>
+          <p:cNvSpPr>
+            <a:spLocks noGrp="1" noRot="1" noChangeAspect="1"/>
+          </p:cNvSpPr>
+          <p:nvPr>
+            <p:ph type="sldImg"/>
+          </p:nvPr>
+        </p:nvSpPr>
+        <p:spPr/>
+      </p:sp>
+      <p:sp>
+        <p:nvSpPr>
+          <p:cNvPr id="3" name="Espaço Reservado para Anotações 2"/>
+          <p:cNvSpPr>
+            <a:spLocks noGrp="1"/>
+          </p:cNvSpPr>
+          <p:nvPr>
+            <p:ph type="body" idx="1"/>
+          </p:nvPr>
+        </p:nvSpPr>
+        <p:spPr/>
+        <p:txBody>
+          <a:bodyPr>
+            <a:normAutofit/>
+          </a:bodyPr>
+          <a:lstStyle/>
+          <a:p>
+            <a:endParaRPr lang="pt-BR"/>
+          </a:p>
+        </p:txBody>
+      </p:sp>
+      <p:sp>
+        <p:nvSpPr>
+          <p:cNvPr id="4" name="Espaço Reservado para Número de Slide 3"/>
+          <p:cNvSpPr>
+            <a:spLocks noGrp="1"/>
+          </p:cNvSpPr>
+          <p:nvPr>
+            <p:ph type="sldNum" sz="quarter" idx="10"/>
+          </p:nvPr>
+        </p:nvSpPr>
+        <p:spPr/>
+        <p:txBody>
+          <a:bodyPr/>
+          <a:lstStyle/>
+          <a:p>
+            <a:fld id="{EBBBFCE1-D48B-48F0-9862-9677497DA945}" type="slidenum">
+              <a:rPr lang="pt-BR" smtClean="0"/>
+              <a:t>14</a:t>
+            </a:fld>
+            <a:endParaRPr lang="pt-BR"/>
+          </a:p>
+        </p:txBody>
+      </p:sp>
+    </p:spTree>
+  </p:cSld>
+  <p:clrMapOvr>
+    <a:masterClrMapping/>
+  </p:clrMapOvr>
+</p:notes>
+</file>
+
+<file path=ppt/notesSlides/notesSlide15.xml><?xml version="1.0" encoding="utf-8"?>
+<p:notes xmlns:a="http://schemas.openxmlformats.org/drawingml/2006/main" xmlns:r="http://schemas.openxmlformats.org/officeDocument/2006/relationships" xmlns:p="http://schemas.openxmlformats.org/presentationml/2006/main">
+  <p:cSld>
+    <p:spTree>
+      <p:nvGrpSpPr>
+        <p:cNvPr id="1" name=""/>
+        <p:cNvGrpSpPr/>
+        <p:nvPr/>
+      </p:nvGrpSpPr>
+      <p:grpSpPr>
+        <a:xfrm>
+          <a:off x="0" y="0"/>
+          <a:ext cx="0" cy="0"/>
+          <a:chOff x="0" y="0"/>
+          <a:chExt cx="0" cy="0"/>
+        </a:xfrm>
+      </p:grpSpPr>
+      <p:sp>
+        <p:nvSpPr>
+          <p:cNvPr id="2" name="Espaço Reservado para Imagem de Slide 1"/>
+          <p:cNvSpPr>
+            <a:spLocks noGrp="1" noRot="1" noChangeAspect="1"/>
+          </p:cNvSpPr>
+          <p:nvPr>
+            <p:ph type="sldImg"/>
+          </p:nvPr>
+        </p:nvSpPr>
+        <p:spPr/>
+      </p:sp>
+      <p:sp>
+        <p:nvSpPr>
+          <p:cNvPr id="3" name="Espaço Reservado para Anotações 2"/>
+          <p:cNvSpPr>
+            <a:spLocks noGrp="1"/>
+          </p:cNvSpPr>
+          <p:nvPr>
+            <p:ph type="body" idx="1"/>
+          </p:nvPr>
+        </p:nvSpPr>
+        <p:spPr/>
+        <p:txBody>
+          <a:bodyPr>
+            <a:normAutofit/>
+          </a:bodyPr>
+          <a:lstStyle/>
+          <a:p>
+            <a:endParaRPr lang="pt-BR"/>
+          </a:p>
+        </p:txBody>
+      </p:sp>
+      <p:sp>
+        <p:nvSpPr>
+          <p:cNvPr id="4" name="Espaço Reservado para Número de Slide 3"/>
+          <p:cNvSpPr>
+            <a:spLocks noGrp="1"/>
+          </p:cNvSpPr>
+          <p:nvPr>
+            <p:ph type="sldNum" sz="quarter" idx="10"/>
+          </p:nvPr>
+        </p:nvSpPr>
+        <p:spPr/>
+        <p:txBody>
+          <a:bodyPr/>
+          <a:lstStyle/>
+          <a:p>
+            <a:fld id="{EBBBFCE1-D48B-48F0-9862-9677497DA945}" type="slidenum">
+              <a:rPr lang="pt-BR" smtClean="0"/>
+              <a:t>15</a:t>
+            </a:fld>
+            <a:endParaRPr lang="pt-BR"/>
+          </a:p>
+        </p:txBody>
+      </p:sp>
+    </p:spTree>
+  </p:cSld>
+  <p:clrMapOvr>
+    <a:masterClrMapping/>
+  </p:clrMapOvr>
+</p:notes>
+</file>
+
 <file path=ppt/notesSlides/notesSlide2.xml><?xml version="1.0" encoding="utf-8"?>
 <p:notes xmlns:a="http://schemas.openxmlformats.org/drawingml/2006/main" xmlns:r="http://schemas.openxmlformats.org/officeDocument/2006/relationships" xmlns:p="http://schemas.openxmlformats.org/presentationml/2006/main">
   <p:cSld>
@@ -589,7 +1084,7 @@
           </a:bodyPr>
           <a:lstStyle/>
           <a:p>
-            <a:endParaRPr lang="pt-BR"/>
+            <a:endParaRPr lang="pt-BR" dirty="0"/>
           </a:p>
         </p:txBody>
       </p:sp>
@@ -935,6 +1430,249 @@
             <a:fld id="{EBBBFCE1-D48B-48F0-9862-9677497DA945}" type="slidenum">
               <a:rPr lang="pt-BR" smtClean="0"/>
               <a:t>6</a:t>
+            </a:fld>
+            <a:endParaRPr lang="pt-BR"/>
+          </a:p>
+        </p:txBody>
+      </p:sp>
+    </p:spTree>
+  </p:cSld>
+  <p:clrMapOvr>
+    <a:masterClrMapping/>
+  </p:clrMapOvr>
+</p:notes>
+</file>
+
+<file path=ppt/notesSlides/notesSlide7.xml><?xml version="1.0" encoding="utf-8"?>
+<p:notes xmlns:a="http://schemas.openxmlformats.org/drawingml/2006/main" xmlns:r="http://schemas.openxmlformats.org/officeDocument/2006/relationships" xmlns:p="http://schemas.openxmlformats.org/presentationml/2006/main">
+  <p:cSld>
+    <p:spTree>
+      <p:nvGrpSpPr>
+        <p:cNvPr id="1" name=""/>
+        <p:cNvGrpSpPr/>
+        <p:nvPr/>
+      </p:nvGrpSpPr>
+      <p:grpSpPr>
+        <a:xfrm>
+          <a:off x="0" y="0"/>
+          <a:ext cx="0" cy="0"/>
+          <a:chOff x="0" y="0"/>
+          <a:chExt cx="0" cy="0"/>
+        </a:xfrm>
+      </p:grpSpPr>
+      <p:sp>
+        <p:nvSpPr>
+          <p:cNvPr id="2" name="Espaço Reservado para Imagem de Slide 1"/>
+          <p:cNvSpPr>
+            <a:spLocks noGrp="1" noRot="1" noChangeAspect="1"/>
+          </p:cNvSpPr>
+          <p:nvPr>
+            <p:ph type="sldImg"/>
+          </p:nvPr>
+        </p:nvSpPr>
+        <p:spPr/>
+      </p:sp>
+      <p:sp>
+        <p:nvSpPr>
+          <p:cNvPr id="3" name="Espaço Reservado para Anotações 2"/>
+          <p:cNvSpPr>
+            <a:spLocks noGrp="1"/>
+          </p:cNvSpPr>
+          <p:nvPr>
+            <p:ph type="body" idx="1"/>
+          </p:nvPr>
+        </p:nvSpPr>
+        <p:spPr/>
+        <p:txBody>
+          <a:bodyPr>
+            <a:normAutofit/>
+          </a:bodyPr>
+          <a:lstStyle/>
+          <a:p>
+            <a:endParaRPr lang="pt-BR"/>
+          </a:p>
+        </p:txBody>
+      </p:sp>
+      <p:sp>
+        <p:nvSpPr>
+          <p:cNvPr id="4" name="Espaço Reservado para Número de Slide 3"/>
+          <p:cNvSpPr>
+            <a:spLocks noGrp="1"/>
+          </p:cNvSpPr>
+          <p:nvPr>
+            <p:ph type="sldNum" sz="quarter" idx="10"/>
+          </p:nvPr>
+        </p:nvSpPr>
+        <p:spPr/>
+        <p:txBody>
+          <a:bodyPr/>
+          <a:lstStyle/>
+          <a:p>
+            <a:fld id="{EBBBFCE1-D48B-48F0-9862-9677497DA945}" type="slidenum">
+              <a:rPr lang="pt-BR" smtClean="0"/>
+              <a:t>7</a:t>
+            </a:fld>
+            <a:endParaRPr lang="pt-BR"/>
+          </a:p>
+        </p:txBody>
+      </p:sp>
+    </p:spTree>
+  </p:cSld>
+  <p:clrMapOvr>
+    <a:masterClrMapping/>
+  </p:clrMapOvr>
+</p:notes>
+</file>
+
+<file path=ppt/notesSlides/notesSlide8.xml><?xml version="1.0" encoding="utf-8"?>
+<p:notes xmlns:a="http://schemas.openxmlformats.org/drawingml/2006/main" xmlns:r="http://schemas.openxmlformats.org/officeDocument/2006/relationships" xmlns:p="http://schemas.openxmlformats.org/presentationml/2006/main">
+  <p:cSld>
+    <p:spTree>
+      <p:nvGrpSpPr>
+        <p:cNvPr id="1" name=""/>
+        <p:cNvGrpSpPr/>
+        <p:nvPr/>
+      </p:nvGrpSpPr>
+      <p:grpSpPr>
+        <a:xfrm>
+          <a:off x="0" y="0"/>
+          <a:ext cx="0" cy="0"/>
+          <a:chOff x="0" y="0"/>
+          <a:chExt cx="0" cy="0"/>
+        </a:xfrm>
+      </p:grpSpPr>
+      <p:sp>
+        <p:nvSpPr>
+          <p:cNvPr id="2" name="Espaço Reservado para Imagem de Slide 1"/>
+          <p:cNvSpPr>
+            <a:spLocks noGrp="1" noRot="1" noChangeAspect="1"/>
+          </p:cNvSpPr>
+          <p:nvPr>
+            <p:ph type="sldImg"/>
+          </p:nvPr>
+        </p:nvSpPr>
+        <p:spPr/>
+      </p:sp>
+      <p:sp>
+        <p:nvSpPr>
+          <p:cNvPr id="3" name="Espaço Reservado para Anotações 2"/>
+          <p:cNvSpPr>
+            <a:spLocks noGrp="1"/>
+          </p:cNvSpPr>
+          <p:nvPr>
+            <p:ph type="body" idx="1"/>
+          </p:nvPr>
+        </p:nvSpPr>
+        <p:spPr/>
+        <p:txBody>
+          <a:bodyPr>
+            <a:normAutofit/>
+          </a:bodyPr>
+          <a:lstStyle/>
+          <a:p>
+            <a:endParaRPr lang="pt-BR"/>
+          </a:p>
+        </p:txBody>
+      </p:sp>
+      <p:sp>
+        <p:nvSpPr>
+          <p:cNvPr id="4" name="Espaço Reservado para Número de Slide 3"/>
+          <p:cNvSpPr>
+            <a:spLocks noGrp="1"/>
+          </p:cNvSpPr>
+          <p:nvPr>
+            <p:ph type="sldNum" sz="quarter" idx="10"/>
+          </p:nvPr>
+        </p:nvSpPr>
+        <p:spPr/>
+        <p:txBody>
+          <a:bodyPr/>
+          <a:lstStyle/>
+          <a:p>
+            <a:fld id="{EBBBFCE1-D48B-48F0-9862-9677497DA945}" type="slidenum">
+              <a:rPr lang="pt-BR" smtClean="0"/>
+              <a:t>8</a:t>
+            </a:fld>
+            <a:endParaRPr lang="pt-BR"/>
+          </a:p>
+        </p:txBody>
+      </p:sp>
+    </p:spTree>
+  </p:cSld>
+  <p:clrMapOvr>
+    <a:masterClrMapping/>
+  </p:clrMapOvr>
+</p:notes>
+</file>
+
+<file path=ppt/notesSlides/notesSlide9.xml><?xml version="1.0" encoding="utf-8"?>
+<p:notes xmlns:a="http://schemas.openxmlformats.org/drawingml/2006/main" xmlns:r="http://schemas.openxmlformats.org/officeDocument/2006/relationships" xmlns:p="http://schemas.openxmlformats.org/presentationml/2006/main">
+  <p:cSld>
+    <p:spTree>
+      <p:nvGrpSpPr>
+        <p:cNvPr id="1" name=""/>
+        <p:cNvGrpSpPr/>
+        <p:nvPr/>
+      </p:nvGrpSpPr>
+      <p:grpSpPr>
+        <a:xfrm>
+          <a:off x="0" y="0"/>
+          <a:ext cx="0" cy="0"/>
+          <a:chOff x="0" y="0"/>
+          <a:chExt cx="0" cy="0"/>
+        </a:xfrm>
+      </p:grpSpPr>
+      <p:sp>
+        <p:nvSpPr>
+          <p:cNvPr id="2" name="Espaço Reservado para Imagem de Slide 1"/>
+          <p:cNvSpPr>
+            <a:spLocks noGrp="1" noRot="1" noChangeAspect="1"/>
+          </p:cNvSpPr>
+          <p:nvPr>
+            <p:ph type="sldImg"/>
+          </p:nvPr>
+        </p:nvSpPr>
+        <p:spPr/>
+      </p:sp>
+      <p:sp>
+        <p:nvSpPr>
+          <p:cNvPr id="3" name="Espaço Reservado para Anotações 2"/>
+          <p:cNvSpPr>
+            <a:spLocks noGrp="1"/>
+          </p:cNvSpPr>
+          <p:nvPr>
+            <p:ph type="body" idx="1"/>
+          </p:nvPr>
+        </p:nvSpPr>
+        <p:spPr/>
+        <p:txBody>
+          <a:bodyPr>
+            <a:normAutofit/>
+          </a:bodyPr>
+          <a:lstStyle/>
+          <a:p>
+            <a:endParaRPr lang="pt-BR"/>
+          </a:p>
+        </p:txBody>
+      </p:sp>
+      <p:sp>
+        <p:nvSpPr>
+          <p:cNvPr id="4" name="Espaço Reservado para Número de Slide 3"/>
+          <p:cNvSpPr>
+            <a:spLocks noGrp="1"/>
+          </p:cNvSpPr>
+          <p:nvPr>
+            <p:ph type="sldNum" sz="quarter" idx="10"/>
+          </p:nvPr>
+        </p:nvSpPr>
+        <p:spPr/>
+        <p:txBody>
+          <a:bodyPr/>
+          <a:lstStyle/>
+          <a:p>
+            <a:fld id="{EBBBFCE1-D48B-48F0-9862-9677497DA945}" type="slidenum">
+              <a:rPr lang="pt-BR" smtClean="0"/>
+              <a:t>9</a:t>
             </a:fld>
             <a:endParaRPr lang="pt-BR"/>
           </a:p>
@@ -4678,7 +5416,7 @@
           <a:p>
             <a:r>
               <a:rPr lang="pt-BR" cap="small" dirty="0" smtClean="0"/>
-              <a:t>TraSim </a:t>
+              <a:t>TEN </a:t>
             </a:r>
             <a:r>
               <a:rPr lang="pt-BR" cap="small" baseline="10000" dirty="0" smtClean="0"/>
@@ -4694,7 +5432,11 @@
             </a:r>
             <a:r>
               <a:rPr lang="pt-BR" cap="small" dirty="0" smtClean="0"/>
-              <a:t> Simulator</a:t>
+              <a:t> </a:t>
+            </a:r>
+            <a:r>
+              <a:rPr lang="pt-BR" cap="small" dirty="0" err="1" smtClean="0"/>
+              <a:t>Engine</a:t>
             </a:r>
             <a:endParaRPr lang="pt-BR" cap="small" dirty="0"/>
           </a:p>
@@ -4978,6 +5720,1111 @@
                 </a:outerShdw>
               </a:effectLst>
             </a:endParaRPr>
+          </a:p>
+        </p:txBody>
+      </p:sp>
+    </p:spTree>
+  </p:cSld>
+  <p:clrMapOvr>
+    <a:masterClrMapping/>
+  </p:clrMapOvr>
+  <p:timing>
+    <p:tnLst>
+      <p:par>
+        <p:cTn id="1" dur="indefinite" restart="never" nodeType="tmRoot"/>
+      </p:par>
+    </p:tnLst>
+  </p:timing>
+</p:sld>
+</file>
+
+<file path=ppt/slides/slide10.xml><?xml version="1.0" encoding="utf-8"?>
+<p:sld xmlns:a="http://schemas.openxmlformats.org/drawingml/2006/main" xmlns:r="http://schemas.openxmlformats.org/officeDocument/2006/relationships" xmlns:p="http://schemas.openxmlformats.org/presentationml/2006/main">
+  <p:cSld>
+    <p:spTree>
+      <p:nvGrpSpPr>
+        <p:cNvPr id="1" name=""/>
+        <p:cNvGrpSpPr/>
+        <p:nvPr/>
+      </p:nvGrpSpPr>
+      <p:grpSpPr>
+        <a:xfrm>
+          <a:off x="0" y="0"/>
+          <a:ext cx="0" cy="0"/>
+          <a:chOff x="0" y="0"/>
+          <a:chExt cx="0" cy="0"/>
+        </a:xfrm>
+      </p:grpSpPr>
+      <p:sp>
+        <p:nvSpPr>
+          <p:cNvPr id="2" name="Título 1"/>
+          <p:cNvSpPr>
+            <a:spLocks noGrp="1"/>
+          </p:cNvSpPr>
+          <p:nvPr>
+            <p:ph type="title"/>
+          </p:nvPr>
+        </p:nvSpPr>
+        <p:spPr/>
+        <p:txBody>
+          <a:bodyPr/>
+          <a:lstStyle/>
+          <a:p>
+            <a:r>
+              <a:rPr lang="pt-BR" dirty="0" smtClean="0"/>
+              <a:t>Riscos</a:t>
+            </a:r>
+            <a:endParaRPr lang="pt-BR" dirty="0"/>
+          </a:p>
+        </p:txBody>
+      </p:sp>
+      <p:graphicFrame>
+        <p:nvGraphicFramePr>
+          <p:cNvPr id="8" name="Espaço Reservado para Conteúdo 7"/>
+          <p:cNvGraphicFramePr>
+            <a:graphicFrameLocks noGrp="1"/>
+          </p:cNvGraphicFramePr>
+          <p:nvPr>
+            <p:ph idx="1"/>
+          </p:nvPr>
+        </p:nvGraphicFramePr>
+        <p:xfrm>
+          <a:off x="228601" y="2360936"/>
+          <a:ext cx="8686799" cy="1925320"/>
+        </p:xfrm>
+        <a:graphic>
+          <a:graphicData uri="http://schemas.openxmlformats.org/drawingml/2006/table">
+            <a:tbl>
+              <a:tblPr firstRow="1" bandRow="1">
+                <a:tableStyleId>{B301B821-A1FF-4177-AEE7-76D212191A09}</a:tableStyleId>
+              </a:tblPr>
+              <a:tblGrid>
+                <a:gridCol w="2500330"/>
+                <a:gridCol w="2071702"/>
+                <a:gridCol w="1785950"/>
+                <a:gridCol w="1152502"/>
+                <a:gridCol w="1176315"/>
+              </a:tblGrid>
+              <a:tr h="370840">
+                <a:tc>
+                  <a:txBody>
+                    <a:bodyPr/>
+                    <a:lstStyle/>
+                    <a:p>
+                      <a:pPr algn="ctr"/>
+                      <a:r>
+                        <a:rPr lang="pt-BR" dirty="0" smtClean="0"/>
+                        <a:t>Risco</a:t>
+                      </a:r>
+                      <a:endParaRPr lang="pt-BR" dirty="0"/>
+                    </a:p>
+                  </a:txBody>
+                  <a:tcPr/>
+                </a:tc>
+                <a:tc>
+                  <a:txBody>
+                    <a:bodyPr/>
+                    <a:lstStyle/>
+                    <a:p>
+                      <a:pPr algn="ctr"/>
+                      <a:r>
+                        <a:rPr lang="pt-BR" dirty="0" smtClean="0"/>
+                        <a:t>Categoria</a:t>
+                      </a:r>
+                      <a:endParaRPr lang="pt-BR" dirty="0"/>
+                    </a:p>
+                  </a:txBody>
+                  <a:tcPr/>
+                </a:tc>
+                <a:tc>
+                  <a:txBody>
+                    <a:bodyPr/>
+                    <a:lstStyle/>
+                    <a:p>
+                      <a:pPr algn="ctr"/>
+                      <a:r>
+                        <a:rPr lang="pt-BR" dirty="0" smtClean="0"/>
+                        <a:t>Probabilidade</a:t>
+                      </a:r>
+                      <a:endParaRPr lang="pt-BR" dirty="0"/>
+                    </a:p>
+                  </a:txBody>
+                  <a:tcPr/>
+                </a:tc>
+                <a:tc>
+                  <a:txBody>
+                    <a:bodyPr/>
+                    <a:lstStyle/>
+                    <a:p>
+                      <a:pPr algn="ctr"/>
+                      <a:r>
+                        <a:rPr lang="pt-BR" dirty="0" smtClean="0"/>
+                        <a:t>Impacto</a:t>
+                      </a:r>
+                      <a:endParaRPr lang="pt-BR" dirty="0"/>
+                    </a:p>
+                  </a:txBody>
+                  <a:tcPr/>
+                </a:tc>
+                <a:tc>
+                  <a:txBody>
+                    <a:bodyPr/>
+                    <a:lstStyle/>
+                    <a:p>
+                      <a:pPr algn="ctr"/>
+                      <a:r>
+                        <a:rPr lang="pt-BR" dirty="0" smtClean="0"/>
+                        <a:t>RMMM</a:t>
+                      </a:r>
+                      <a:endParaRPr lang="pt-BR" dirty="0"/>
+                    </a:p>
+                  </a:txBody>
+                  <a:tcPr/>
+                </a:tc>
+              </a:tr>
+              <a:tr h="370840">
+                <a:tc>
+                  <a:txBody>
+                    <a:bodyPr/>
+                    <a:lstStyle/>
+                    <a:p>
+                      <a:pPr algn="ctr"/>
+                      <a:r>
+                        <a:rPr lang="pt-BR" dirty="0" smtClean="0"/>
+                        <a:t>Aumento exagerado do número de linhas</a:t>
+                      </a:r>
+                      <a:r>
+                        <a:rPr lang="pt-BR" baseline="0" dirty="0" smtClean="0"/>
+                        <a:t> de código do simulador</a:t>
+                      </a:r>
+                      <a:endParaRPr lang="pt-BR" dirty="0"/>
+                    </a:p>
+                  </a:txBody>
+                  <a:tcPr anchor="ctr"/>
+                </a:tc>
+                <a:tc>
+                  <a:txBody>
+                    <a:bodyPr/>
+                    <a:lstStyle/>
+                    <a:p>
+                      <a:pPr algn="ctr"/>
+                      <a:r>
+                        <a:rPr lang="pt-BR" dirty="0" smtClean="0"/>
+                        <a:t>Tamanho do Produto</a:t>
+                      </a:r>
+                      <a:endParaRPr lang="pt-BR" dirty="0"/>
+                    </a:p>
+                  </a:txBody>
+                  <a:tcPr anchor="ctr"/>
+                </a:tc>
+                <a:tc>
+                  <a:txBody>
+                    <a:bodyPr/>
+                    <a:lstStyle/>
+                    <a:p>
+                      <a:pPr algn="ctr"/>
+                      <a:r>
+                        <a:rPr lang="pt-BR" dirty="0" smtClean="0"/>
+                        <a:t>50%</a:t>
+                      </a:r>
+                      <a:endParaRPr lang="pt-BR" dirty="0"/>
+                    </a:p>
+                  </a:txBody>
+                  <a:tcPr anchor="ctr"/>
+                </a:tc>
+                <a:tc>
+                  <a:txBody>
+                    <a:bodyPr/>
+                    <a:lstStyle/>
+                    <a:p>
+                      <a:pPr algn="ctr"/>
+                      <a:r>
+                        <a:rPr lang="pt-BR" dirty="0" smtClean="0"/>
+                        <a:t>3</a:t>
+                      </a:r>
+                      <a:endParaRPr lang="pt-BR" dirty="0"/>
+                    </a:p>
+                  </a:txBody>
+                  <a:tcPr anchor="ctr"/>
+                </a:tc>
+                <a:tc>
+                  <a:txBody>
+                    <a:bodyPr/>
+                    <a:lstStyle/>
+                    <a:p>
+                      <a:pPr algn="ctr"/>
+                      <a:r>
+                        <a:rPr lang="pt-BR" dirty="0" smtClean="0"/>
+                        <a:t>R1</a:t>
+                      </a:r>
+                      <a:endParaRPr lang="pt-BR" dirty="0"/>
+                    </a:p>
+                  </a:txBody>
+                  <a:tcPr anchor="ctr"/>
+                </a:tc>
+              </a:tr>
+              <a:tr h="370840">
+                <a:tc>
+                  <a:txBody>
+                    <a:bodyPr/>
+                    <a:lstStyle/>
+                    <a:p>
+                      <a:pPr algn="ctr"/>
+                      <a:r>
+                        <a:rPr lang="pt-BR" dirty="0" smtClean="0"/>
+                        <a:t>Prazo não atendido</a:t>
+                      </a:r>
+                      <a:endParaRPr lang="pt-BR" dirty="0"/>
+                    </a:p>
+                  </a:txBody>
+                  <a:tcPr anchor="ctr"/>
+                </a:tc>
+                <a:tc>
+                  <a:txBody>
+                    <a:bodyPr/>
+                    <a:lstStyle/>
+                    <a:p>
+                      <a:pPr algn="ctr"/>
+                      <a:r>
+                        <a:rPr lang="pt-BR" dirty="0" smtClean="0"/>
+                        <a:t>Definição do Processo</a:t>
+                      </a:r>
+                      <a:endParaRPr lang="pt-BR" dirty="0"/>
+                    </a:p>
+                  </a:txBody>
+                  <a:tcPr anchor="ctr"/>
+                </a:tc>
+                <a:tc>
+                  <a:txBody>
+                    <a:bodyPr/>
+                    <a:lstStyle/>
+                    <a:p>
+                      <a:pPr algn="ctr"/>
+                      <a:r>
+                        <a:rPr lang="pt-BR" dirty="0" smtClean="0"/>
+                        <a:t>40%</a:t>
+                      </a:r>
+                      <a:endParaRPr lang="pt-BR" dirty="0"/>
+                    </a:p>
+                  </a:txBody>
+                  <a:tcPr anchor="ctr"/>
+                </a:tc>
+                <a:tc>
+                  <a:txBody>
+                    <a:bodyPr/>
+                    <a:lstStyle/>
+                    <a:p>
+                      <a:pPr algn="ctr"/>
+                      <a:r>
+                        <a:rPr lang="pt-BR" dirty="0" smtClean="0"/>
+                        <a:t>2</a:t>
+                      </a:r>
+                      <a:endParaRPr lang="pt-BR" dirty="0"/>
+                    </a:p>
+                  </a:txBody>
+                  <a:tcPr anchor="ctr"/>
+                </a:tc>
+                <a:tc>
+                  <a:txBody>
+                    <a:bodyPr/>
+                    <a:lstStyle/>
+                    <a:p>
+                      <a:pPr algn="ctr"/>
+                      <a:r>
+                        <a:rPr lang="pt-BR" dirty="0" smtClean="0"/>
+                        <a:t>R2</a:t>
+                      </a:r>
+                      <a:endParaRPr lang="pt-BR" dirty="0"/>
+                    </a:p>
+                  </a:txBody>
+                  <a:tcPr anchor="ctr"/>
+                </a:tc>
+              </a:tr>
+            </a:tbl>
+          </a:graphicData>
+        </a:graphic>
+      </p:graphicFrame>
+      <p:sp>
+        <p:nvSpPr>
+          <p:cNvPr id="9" name="Espaço Reservado para Conteúdo 2"/>
+          <p:cNvSpPr txBox="1">
+            <a:spLocks/>
+          </p:cNvSpPr>
+          <p:nvPr/>
+        </p:nvSpPr>
+        <p:spPr>
+          <a:xfrm>
+            <a:off x="457200" y="1775191"/>
+            <a:ext cx="8229600" cy="4625609"/>
+          </a:xfrm>
+          <a:prstGeom prst="rect">
+            <a:avLst/>
+          </a:prstGeom>
+        </p:spPr>
+        <p:txBody>
+          <a:bodyPr vert="horz" lIns="54864" tIns="91440" rtlCol="0">
+            <a:normAutofit/>
+          </a:bodyPr>
+          <a:lstStyle/>
+          <a:p>
+            <a:pPr marL="438912" marR="0" lvl="0" indent="-320040" algn="l" defTabSz="914400" rtl="0" eaLnBrk="1" fontAlgn="auto" latinLnBrk="0" hangingPunct="1">
+              <a:lnSpc>
+                <a:spcPct val="100000"/>
+              </a:lnSpc>
+              <a:spcBef>
+                <a:spcPts val="0"/>
+              </a:spcBef>
+              <a:spcAft>
+                <a:spcPts val="0"/>
+              </a:spcAft>
+              <a:buClr>
+                <a:schemeClr val="accent1"/>
+              </a:buClr>
+              <a:buSzPct val="80000"/>
+              <a:buFont typeface="Wingdings 2"/>
+              <a:buChar char=""/>
+              <a:tabLst/>
+              <a:defRPr/>
+            </a:pPr>
+            <a:endParaRPr kumimoji="0" lang="pt-BR" sz="3200" b="0" i="0" u="none" strike="noStrike" kern="1200" cap="none" spc="0" normalizeH="0" baseline="0" noProof="0" dirty="0" smtClean="0">
+              <a:ln>
+                <a:noFill/>
+              </a:ln>
+              <a:solidFill>
+                <a:schemeClr val="tx1"/>
+              </a:solidFill>
+              <a:effectLst/>
+              <a:uLnTx/>
+              <a:uFillTx/>
+              <a:latin typeface="+mn-lt"/>
+              <a:ea typeface="+mn-ea"/>
+              <a:cs typeface="+mn-cs"/>
+            </a:endParaRPr>
+          </a:p>
+        </p:txBody>
+      </p:sp>
+    </p:spTree>
+  </p:cSld>
+  <p:clrMapOvr>
+    <a:masterClrMapping/>
+  </p:clrMapOvr>
+  <p:timing>
+    <p:tnLst>
+      <p:par>
+        <p:cTn id="1" dur="indefinite" restart="never" nodeType="tmRoot"/>
+      </p:par>
+    </p:tnLst>
+  </p:timing>
+</p:sld>
+</file>
+
+<file path=ppt/slides/slide11.xml><?xml version="1.0" encoding="utf-8"?>
+<p:sld xmlns:a="http://schemas.openxmlformats.org/drawingml/2006/main" xmlns:r="http://schemas.openxmlformats.org/officeDocument/2006/relationships" xmlns:p="http://schemas.openxmlformats.org/presentationml/2006/main">
+  <p:cSld>
+    <p:spTree>
+      <p:nvGrpSpPr>
+        <p:cNvPr id="1" name=""/>
+        <p:cNvGrpSpPr/>
+        <p:nvPr/>
+      </p:nvGrpSpPr>
+      <p:grpSpPr>
+        <a:xfrm>
+          <a:off x="0" y="0"/>
+          <a:ext cx="0" cy="0"/>
+          <a:chOff x="0" y="0"/>
+          <a:chExt cx="0" cy="0"/>
+        </a:xfrm>
+      </p:grpSpPr>
+      <p:sp>
+        <p:nvSpPr>
+          <p:cNvPr id="2" name="Título 1"/>
+          <p:cNvSpPr>
+            <a:spLocks noGrp="1"/>
+          </p:cNvSpPr>
+          <p:nvPr>
+            <p:ph type="title"/>
+          </p:nvPr>
+        </p:nvSpPr>
+        <p:spPr/>
+        <p:txBody>
+          <a:bodyPr/>
+          <a:lstStyle/>
+          <a:p>
+            <a:r>
+              <a:rPr lang="pt-BR" dirty="0" smtClean="0"/>
+              <a:t>Modelo de Processos</a:t>
+            </a:r>
+            <a:endParaRPr lang="pt-BR" dirty="0"/>
+          </a:p>
+        </p:txBody>
+      </p:sp>
+      <p:sp>
+        <p:nvSpPr>
+          <p:cNvPr id="3" name="Espaço Reservado para Conteúdo 2"/>
+          <p:cNvSpPr>
+            <a:spLocks noGrp="1"/>
+          </p:cNvSpPr>
+          <p:nvPr>
+            <p:ph idx="1"/>
+          </p:nvPr>
+        </p:nvSpPr>
+        <p:spPr/>
+        <p:txBody>
+          <a:bodyPr/>
+          <a:lstStyle/>
+          <a:p>
+            <a:pPr algn="just"/>
+            <a:r>
+              <a:rPr lang="pt-BR" dirty="0" smtClean="0"/>
+              <a:t>O projeto segue o Modelo de Processo em Cascata, também conhecido como </a:t>
+            </a:r>
+            <a:r>
+              <a:rPr lang="pt-BR" i="1" dirty="0" smtClean="0"/>
+              <a:t>Ciclo de Vida Clássico</a:t>
+            </a:r>
+            <a:endParaRPr lang="pt-BR" dirty="0"/>
+          </a:p>
+        </p:txBody>
+      </p:sp>
+      <p:sp>
+        <p:nvSpPr>
+          <p:cNvPr id="4" name="Retângulo 3"/>
+          <p:cNvSpPr/>
+          <p:nvPr/>
+        </p:nvSpPr>
+        <p:spPr>
+          <a:xfrm>
+            <a:off x="285720" y="4000504"/>
+            <a:ext cx="1928826" cy="642942"/>
+          </a:xfrm>
+          <a:prstGeom prst="rect">
+            <a:avLst/>
+          </a:prstGeom>
+        </p:spPr>
+        <p:style>
+          <a:lnRef idx="2">
+            <a:schemeClr val="accent1">
+              <a:shade val="50000"/>
+            </a:schemeClr>
+          </a:lnRef>
+          <a:fillRef idx="1">
+            <a:schemeClr val="accent1"/>
+          </a:fillRef>
+          <a:effectRef idx="0">
+            <a:schemeClr val="accent1"/>
+          </a:effectRef>
+          <a:fontRef idx="minor">
+            <a:schemeClr val="lt1"/>
+          </a:fontRef>
+        </p:style>
+        <p:txBody>
+          <a:bodyPr rtlCol="0" anchor="ctr"/>
+          <a:lstStyle/>
+          <a:p>
+            <a:pPr algn="ctr"/>
+            <a:r>
+              <a:rPr lang="pt-BR" sz="2200" b="1" dirty="0" smtClean="0"/>
+              <a:t>Planejamento</a:t>
+            </a:r>
+            <a:endParaRPr lang="pt-BR" sz="2200" b="1" dirty="0"/>
+          </a:p>
+        </p:txBody>
+      </p:sp>
+      <p:sp>
+        <p:nvSpPr>
+          <p:cNvPr id="8" name="Retângulo 7"/>
+          <p:cNvSpPr/>
+          <p:nvPr/>
+        </p:nvSpPr>
+        <p:spPr>
+          <a:xfrm>
+            <a:off x="2500298" y="4357694"/>
+            <a:ext cx="1928826" cy="642942"/>
+          </a:xfrm>
+          <a:prstGeom prst="rect">
+            <a:avLst/>
+          </a:prstGeom>
+        </p:spPr>
+        <p:style>
+          <a:lnRef idx="2">
+            <a:schemeClr val="accent1">
+              <a:shade val="50000"/>
+            </a:schemeClr>
+          </a:lnRef>
+          <a:fillRef idx="1">
+            <a:schemeClr val="accent1"/>
+          </a:fillRef>
+          <a:effectRef idx="0">
+            <a:schemeClr val="accent1"/>
+          </a:effectRef>
+          <a:fontRef idx="minor">
+            <a:schemeClr val="lt1"/>
+          </a:fontRef>
+        </p:style>
+        <p:txBody>
+          <a:bodyPr rtlCol="0" anchor="ctr"/>
+          <a:lstStyle/>
+          <a:p>
+            <a:pPr algn="ctr"/>
+            <a:r>
+              <a:rPr lang="pt-BR" sz="2200" b="1" dirty="0" smtClean="0"/>
+              <a:t>Análise</a:t>
+            </a:r>
+            <a:endParaRPr lang="pt-BR" sz="2200" b="1" dirty="0"/>
+          </a:p>
+        </p:txBody>
+      </p:sp>
+      <p:sp>
+        <p:nvSpPr>
+          <p:cNvPr id="9" name="Retângulo 8"/>
+          <p:cNvSpPr/>
+          <p:nvPr/>
+        </p:nvSpPr>
+        <p:spPr>
+          <a:xfrm>
+            <a:off x="4714876" y="4714884"/>
+            <a:ext cx="1928826" cy="642942"/>
+          </a:xfrm>
+          <a:prstGeom prst="rect">
+            <a:avLst/>
+          </a:prstGeom>
+        </p:spPr>
+        <p:style>
+          <a:lnRef idx="2">
+            <a:schemeClr val="accent1">
+              <a:shade val="50000"/>
+            </a:schemeClr>
+          </a:lnRef>
+          <a:fillRef idx="1">
+            <a:schemeClr val="accent1"/>
+          </a:fillRef>
+          <a:effectRef idx="0">
+            <a:schemeClr val="accent1"/>
+          </a:effectRef>
+          <a:fontRef idx="minor">
+            <a:schemeClr val="lt1"/>
+          </a:fontRef>
+        </p:style>
+        <p:txBody>
+          <a:bodyPr rtlCol="0" anchor="ctr"/>
+          <a:lstStyle/>
+          <a:p>
+            <a:pPr algn="ctr"/>
+            <a:r>
+              <a:rPr lang="pt-BR" sz="2200" b="1" dirty="0" smtClean="0"/>
+              <a:t>Design</a:t>
+            </a:r>
+            <a:endParaRPr lang="pt-BR" sz="2200" b="1" dirty="0"/>
+          </a:p>
+        </p:txBody>
+      </p:sp>
+      <p:sp>
+        <p:nvSpPr>
+          <p:cNvPr id="10" name="Retângulo 9"/>
+          <p:cNvSpPr/>
+          <p:nvPr/>
+        </p:nvSpPr>
+        <p:spPr>
+          <a:xfrm>
+            <a:off x="6929454" y="5143512"/>
+            <a:ext cx="1928826" cy="642942"/>
+          </a:xfrm>
+          <a:prstGeom prst="rect">
+            <a:avLst/>
+          </a:prstGeom>
+        </p:spPr>
+        <p:style>
+          <a:lnRef idx="2">
+            <a:schemeClr val="accent1">
+              <a:shade val="50000"/>
+            </a:schemeClr>
+          </a:lnRef>
+          <a:fillRef idx="1">
+            <a:schemeClr val="accent1"/>
+          </a:fillRef>
+          <a:effectRef idx="0">
+            <a:schemeClr val="accent1"/>
+          </a:effectRef>
+          <a:fontRef idx="minor">
+            <a:schemeClr val="lt1"/>
+          </a:fontRef>
+        </p:style>
+        <p:txBody>
+          <a:bodyPr rtlCol="0" anchor="ctr"/>
+          <a:lstStyle/>
+          <a:p>
+            <a:pPr algn="ctr"/>
+            <a:r>
+              <a:rPr lang="pt-BR" sz="2200" b="1" dirty="0" smtClean="0"/>
+              <a:t>Codificação</a:t>
+            </a:r>
+            <a:endParaRPr lang="pt-BR" sz="2200" b="1" dirty="0"/>
+          </a:p>
+        </p:txBody>
+      </p:sp>
+      <p:cxnSp>
+        <p:nvCxnSpPr>
+          <p:cNvPr id="12" name="Forma 11"/>
+          <p:cNvCxnSpPr>
+            <a:stCxn id="4" idx="2"/>
+          </p:cNvCxnSpPr>
+          <p:nvPr/>
+        </p:nvCxnSpPr>
+        <p:spPr>
+          <a:xfrm rot="16200000" flipH="1">
+            <a:off x="1768058" y="4125520"/>
+            <a:ext cx="214316" cy="1250167"/>
+          </a:xfrm>
+          <a:prstGeom prst="bentConnector2">
+            <a:avLst/>
+          </a:prstGeom>
+          <a:ln w="25400" cmpd="sng">
+            <a:tailEnd type="arrow"/>
+          </a:ln>
+        </p:spPr>
+        <p:style>
+          <a:lnRef idx="1">
+            <a:schemeClr val="accent1"/>
+          </a:lnRef>
+          <a:fillRef idx="0">
+            <a:schemeClr val="accent1"/>
+          </a:fillRef>
+          <a:effectRef idx="0">
+            <a:schemeClr val="accent1"/>
+          </a:effectRef>
+          <a:fontRef idx="minor">
+            <a:schemeClr val="tx1"/>
+          </a:fontRef>
+        </p:style>
+      </p:cxnSp>
+      <p:cxnSp>
+        <p:nvCxnSpPr>
+          <p:cNvPr id="17" name="Forma 16"/>
+          <p:cNvCxnSpPr/>
+          <p:nvPr/>
+        </p:nvCxnSpPr>
+        <p:spPr>
+          <a:xfrm rot="16200000" flipH="1">
+            <a:off x="3982634" y="4482708"/>
+            <a:ext cx="214316" cy="1250167"/>
+          </a:xfrm>
+          <a:prstGeom prst="bentConnector2">
+            <a:avLst/>
+          </a:prstGeom>
+          <a:ln w="25400" cmpd="sng">
+            <a:tailEnd type="arrow"/>
+          </a:ln>
+        </p:spPr>
+        <p:style>
+          <a:lnRef idx="1">
+            <a:schemeClr val="accent1"/>
+          </a:lnRef>
+          <a:fillRef idx="0">
+            <a:schemeClr val="accent1"/>
+          </a:fillRef>
+          <a:effectRef idx="0">
+            <a:schemeClr val="accent1"/>
+          </a:effectRef>
+          <a:fontRef idx="minor">
+            <a:schemeClr val="tx1"/>
+          </a:fontRef>
+        </p:style>
+      </p:cxnSp>
+      <p:cxnSp>
+        <p:nvCxnSpPr>
+          <p:cNvPr id="18" name="Forma 17"/>
+          <p:cNvCxnSpPr/>
+          <p:nvPr/>
+        </p:nvCxnSpPr>
+        <p:spPr>
+          <a:xfrm rot="16200000" flipH="1">
+            <a:off x="6197212" y="4839901"/>
+            <a:ext cx="214316" cy="1250167"/>
+          </a:xfrm>
+          <a:prstGeom prst="bentConnector2">
+            <a:avLst/>
+          </a:prstGeom>
+          <a:ln w="25400" cmpd="sng">
+            <a:tailEnd type="arrow"/>
+          </a:ln>
+        </p:spPr>
+        <p:style>
+          <a:lnRef idx="1">
+            <a:schemeClr val="accent1"/>
+          </a:lnRef>
+          <a:fillRef idx="0">
+            <a:schemeClr val="accent1"/>
+          </a:fillRef>
+          <a:effectRef idx="0">
+            <a:schemeClr val="accent1"/>
+          </a:effectRef>
+          <a:fontRef idx="minor">
+            <a:schemeClr val="tx1"/>
+          </a:fontRef>
+        </p:style>
+      </p:cxnSp>
+    </p:spTree>
+  </p:cSld>
+  <p:clrMapOvr>
+    <a:masterClrMapping/>
+  </p:clrMapOvr>
+  <p:timing>
+    <p:tnLst>
+      <p:par>
+        <p:cTn id="1" dur="indefinite" restart="never" nodeType="tmRoot"/>
+      </p:par>
+    </p:tnLst>
+  </p:timing>
+</p:sld>
+</file>
+
+<file path=ppt/slides/slide12.xml><?xml version="1.0" encoding="utf-8"?>
+<p:sld xmlns:a="http://schemas.openxmlformats.org/drawingml/2006/main" xmlns:r="http://schemas.openxmlformats.org/officeDocument/2006/relationships" xmlns:p="http://schemas.openxmlformats.org/presentationml/2006/main">
+  <p:cSld>
+    <p:spTree>
+      <p:nvGrpSpPr>
+        <p:cNvPr id="1" name=""/>
+        <p:cNvGrpSpPr/>
+        <p:nvPr/>
+      </p:nvGrpSpPr>
+      <p:grpSpPr>
+        <a:xfrm>
+          <a:off x="0" y="0"/>
+          <a:ext cx="0" cy="0"/>
+          <a:chOff x="0" y="0"/>
+          <a:chExt cx="0" cy="0"/>
+        </a:xfrm>
+      </p:grpSpPr>
+      <p:sp>
+        <p:nvSpPr>
+          <p:cNvPr id="2" name="Título 1"/>
+          <p:cNvSpPr>
+            <a:spLocks noGrp="1"/>
+          </p:cNvSpPr>
+          <p:nvPr>
+            <p:ph type="title"/>
+          </p:nvPr>
+        </p:nvSpPr>
+        <p:spPr/>
+        <p:txBody>
+          <a:bodyPr>
+            <a:normAutofit fontScale="90000"/>
+          </a:bodyPr>
+          <a:lstStyle/>
+          <a:p>
+            <a:r>
+              <a:rPr lang="pt-BR" dirty="0" smtClean="0"/>
+              <a:t>Métodos, Ferramentas e Técnicas</a:t>
+            </a:r>
+            <a:endParaRPr lang="pt-BR" dirty="0"/>
+          </a:p>
+        </p:txBody>
+      </p:sp>
+      <p:sp>
+        <p:nvSpPr>
+          <p:cNvPr id="3" name="Espaço Reservado para Conteúdo 2"/>
+          <p:cNvSpPr>
+            <a:spLocks noGrp="1"/>
+          </p:cNvSpPr>
+          <p:nvPr>
+            <p:ph idx="1"/>
+          </p:nvPr>
+        </p:nvSpPr>
+        <p:spPr/>
+        <p:txBody>
+          <a:bodyPr/>
+          <a:lstStyle/>
+          <a:p>
+            <a:r>
+              <a:rPr lang="pt-BR" dirty="0" smtClean="0"/>
+              <a:t>Metodologia orientada a objeto</a:t>
+            </a:r>
+          </a:p>
+          <a:p>
+            <a:endParaRPr lang="pt-BR" dirty="0" smtClean="0"/>
+          </a:p>
+          <a:p>
+            <a:r>
+              <a:rPr lang="pt-BR" dirty="0" smtClean="0"/>
+              <a:t>Linguagem: C#</a:t>
+            </a:r>
+          </a:p>
+          <a:p>
+            <a:endParaRPr lang="pt-BR" dirty="0" smtClean="0"/>
+          </a:p>
+          <a:p>
+            <a:r>
+              <a:rPr lang="pt-BR" dirty="0" smtClean="0"/>
+              <a:t>IDE: Microsoft Visual Studio 2008</a:t>
+            </a:r>
+          </a:p>
+          <a:p>
+            <a:endParaRPr lang="pt-BR" dirty="0"/>
+          </a:p>
+        </p:txBody>
+      </p:sp>
+    </p:spTree>
+  </p:cSld>
+  <p:clrMapOvr>
+    <a:masterClrMapping/>
+  </p:clrMapOvr>
+  <p:timing>
+    <p:tnLst>
+      <p:par>
+        <p:cTn id="1" dur="indefinite" restart="never" nodeType="tmRoot"/>
+      </p:par>
+    </p:tnLst>
+  </p:timing>
+</p:sld>
+</file>
+
+<file path=ppt/slides/slide13.xml><?xml version="1.0" encoding="utf-8"?>
+<p:sld xmlns:a="http://schemas.openxmlformats.org/drawingml/2006/main" xmlns:r="http://schemas.openxmlformats.org/officeDocument/2006/relationships" xmlns:p="http://schemas.openxmlformats.org/presentationml/2006/main">
+  <p:cSld>
+    <p:spTree>
+      <p:nvGrpSpPr>
+        <p:cNvPr id="1" name=""/>
+        <p:cNvGrpSpPr/>
+        <p:nvPr/>
+      </p:nvGrpSpPr>
+      <p:grpSpPr>
+        <a:xfrm>
+          <a:off x="0" y="0"/>
+          <a:ext cx="0" cy="0"/>
+          <a:chOff x="0" y="0"/>
+          <a:chExt cx="0" cy="0"/>
+        </a:xfrm>
+      </p:grpSpPr>
+      <p:sp>
+        <p:nvSpPr>
+          <p:cNvPr id="2" name="Título 1"/>
+          <p:cNvSpPr>
+            <a:spLocks noGrp="1"/>
+          </p:cNvSpPr>
+          <p:nvPr>
+            <p:ph type="title"/>
+          </p:nvPr>
+        </p:nvSpPr>
+        <p:spPr/>
+        <p:txBody>
+          <a:bodyPr/>
+          <a:lstStyle/>
+          <a:p>
+            <a:r>
+              <a:rPr lang="pt-BR" dirty="0" smtClean="0"/>
+              <a:t>Gerenciamento de Configuração</a:t>
+            </a:r>
+            <a:endParaRPr lang="pt-BR" dirty="0"/>
+          </a:p>
+        </p:txBody>
+      </p:sp>
+      <p:sp>
+        <p:nvSpPr>
+          <p:cNvPr id="3" name="Espaço Reservado para Conteúdo 2"/>
+          <p:cNvSpPr>
+            <a:spLocks noGrp="1"/>
+          </p:cNvSpPr>
+          <p:nvPr>
+            <p:ph idx="1"/>
+          </p:nvPr>
+        </p:nvSpPr>
+        <p:spPr/>
+        <p:txBody>
+          <a:bodyPr/>
+          <a:lstStyle/>
+          <a:p>
+            <a:pPr algn="just"/>
+            <a:r>
+              <a:rPr lang="pt-BR" dirty="0" smtClean="0"/>
+              <a:t>Para o controle de versões, será utilizado o </a:t>
+            </a:r>
+            <a:r>
+              <a:rPr lang="pt-BR" dirty="0" err="1" smtClean="0"/>
+              <a:t>Subversion</a:t>
+            </a:r>
+            <a:endParaRPr lang="pt-BR" dirty="0" smtClean="0"/>
+          </a:p>
+          <a:p>
+            <a:pPr algn="just"/>
+            <a:r>
+              <a:rPr lang="pt-BR" dirty="0" smtClean="0"/>
+              <a:t>O repositório será acessado através da interface </a:t>
+            </a:r>
+            <a:r>
+              <a:rPr lang="pt-BR" dirty="0" err="1" smtClean="0"/>
+              <a:t>TortoiseSVN</a:t>
+            </a:r>
+            <a:endParaRPr lang="pt-BR" dirty="0" smtClean="0"/>
+          </a:p>
+          <a:p>
+            <a:pPr algn="just"/>
+            <a:r>
+              <a:rPr lang="pt-BR" dirty="0" smtClean="0"/>
+              <a:t>Todos os documentos, incluindo o PGPS, possuem um controle de versões no início de cada arquivo</a:t>
+            </a:r>
+            <a:endParaRPr lang="pt-BR" dirty="0"/>
+          </a:p>
+        </p:txBody>
+      </p:sp>
+    </p:spTree>
+  </p:cSld>
+  <p:clrMapOvr>
+    <a:masterClrMapping/>
+  </p:clrMapOvr>
+  <p:timing>
+    <p:tnLst>
+      <p:par>
+        <p:cTn id="1" dur="indefinite" restart="never" nodeType="tmRoot"/>
+      </p:par>
+    </p:tnLst>
+  </p:timing>
+</p:sld>
+</file>
+
+<file path=ppt/slides/slide14.xml><?xml version="1.0" encoding="utf-8"?>
+<p:sld xmlns:a="http://schemas.openxmlformats.org/drawingml/2006/main" xmlns:r="http://schemas.openxmlformats.org/officeDocument/2006/relationships" xmlns:p="http://schemas.openxmlformats.org/presentationml/2006/main">
+  <p:cSld>
+    <p:spTree>
+      <p:nvGrpSpPr>
+        <p:cNvPr id="1" name=""/>
+        <p:cNvGrpSpPr/>
+        <p:nvPr/>
+      </p:nvGrpSpPr>
+      <p:grpSpPr>
+        <a:xfrm>
+          <a:off x="0" y="0"/>
+          <a:ext cx="0" cy="0"/>
+          <a:chOff x="0" y="0"/>
+          <a:chExt cx="0" cy="0"/>
+        </a:xfrm>
+      </p:grpSpPr>
+      <p:sp>
+        <p:nvSpPr>
+          <p:cNvPr id="2" name="Título 1"/>
+          <p:cNvSpPr>
+            <a:spLocks noGrp="1"/>
+          </p:cNvSpPr>
+          <p:nvPr>
+            <p:ph type="title"/>
+          </p:nvPr>
+        </p:nvSpPr>
+        <p:spPr/>
+        <p:txBody>
+          <a:bodyPr/>
+          <a:lstStyle/>
+          <a:p>
+            <a:r>
+              <a:rPr lang="pt-BR" dirty="0" smtClean="0"/>
+              <a:t>Próximo Passo</a:t>
+            </a:r>
+            <a:endParaRPr lang="pt-BR" dirty="0"/>
+          </a:p>
+        </p:txBody>
+      </p:sp>
+      <p:sp>
+        <p:nvSpPr>
+          <p:cNvPr id="7" name="Espaço Reservado para Conteúdo 6"/>
+          <p:cNvSpPr>
+            <a:spLocks noGrp="1"/>
+          </p:cNvSpPr>
+          <p:nvPr>
+            <p:ph idx="1"/>
+          </p:nvPr>
+        </p:nvSpPr>
+        <p:spPr/>
+        <p:txBody>
+          <a:bodyPr/>
+          <a:lstStyle/>
+          <a:p>
+            <a:r>
+              <a:rPr lang="pt-BR" dirty="0" smtClean="0"/>
+              <a:t>Análise:</a:t>
+            </a:r>
+          </a:p>
+          <a:p>
+            <a:pPr lvl="1"/>
+            <a:r>
+              <a:rPr lang="pt-BR" dirty="0" smtClean="0"/>
+              <a:t>2º seminário: 18/05/2009</a:t>
+            </a:r>
+            <a:endParaRPr lang="pt-BR" dirty="0"/>
+          </a:p>
+        </p:txBody>
+      </p:sp>
+    </p:spTree>
+  </p:cSld>
+  <p:clrMapOvr>
+    <a:masterClrMapping/>
+  </p:clrMapOvr>
+  <p:timing>
+    <p:tnLst>
+      <p:par>
+        <p:cTn id="1" dur="indefinite" restart="never" nodeType="tmRoot"/>
+      </p:par>
+    </p:tnLst>
+  </p:timing>
+</p:sld>
+</file>
+
+<file path=ppt/slides/slide15.xml><?xml version="1.0" encoding="utf-8"?>
+<p:sld xmlns:a="http://schemas.openxmlformats.org/drawingml/2006/main" xmlns:r="http://schemas.openxmlformats.org/officeDocument/2006/relationships" xmlns:p="http://schemas.openxmlformats.org/presentationml/2006/main">
+  <p:cSld>
+    <p:spTree>
+      <p:nvGrpSpPr>
+        <p:cNvPr id="1" name=""/>
+        <p:cNvGrpSpPr/>
+        <p:nvPr/>
+      </p:nvGrpSpPr>
+      <p:grpSpPr>
+        <a:xfrm>
+          <a:off x="0" y="0"/>
+          <a:ext cx="0" cy="0"/>
+          <a:chOff x="0" y="0"/>
+          <a:chExt cx="0" cy="0"/>
+        </a:xfrm>
+      </p:grpSpPr>
+      <p:sp>
+        <p:nvSpPr>
+          <p:cNvPr id="4" name="Título 3"/>
+          <p:cNvSpPr>
+            <a:spLocks noGrp="1"/>
+          </p:cNvSpPr>
+          <p:nvPr>
+            <p:ph type="ctrTitle"/>
+          </p:nvPr>
+        </p:nvSpPr>
+        <p:spPr/>
+        <p:txBody>
+          <a:bodyPr>
+            <a:normAutofit/>
+          </a:bodyPr>
+          <a:lstStyle/>
+          <a:p>
+            <a:pPr algn="ctr"/>
+            <a:r>
+              <a:rPr lang="pt-BR" sz="6400" dirty="0" smtClean="0"/>
+              <a:t>Obrigado!</a:t>
+            </a:r>
+            <a:endParaRPr lang="pt-BR" sz="6400" dirty="0"/>
+          </a:p>
+        </p:txBody>
+      </p:sp>
+      <p:sp>
+        <p:nvSpPr>
+          <p:cNvPr id="5" name="Subtítulo 4"/>
+          <p:cNvSpPr>
+            <a:spLocks noGrp="1"/>
+          </p:cNvSpPr>
+          <p:nvPr>
+            <p:ph type="subTitle" idx="1"/>
+          </p:nvPr>
+        </p:nvSpPr>
+        <p:spPr/>
+        <p:txBody>
+          <a:bodyPr/>
+          <a:lstStyle/>
+          <a:p>
+            <a:endParaRPr lang="pt-BR" dirty="0"/>
           </a:p>
         </p:txBody>
       </p:sp>
@@ -5029,12 +6876,8 @@
           <a:lstStyle/>
           <a:p>
             <a:r>
-              <a:rPr lang="pt-BR" dirty="0" err="1" smtClean="0"/>
-              <a:t>Su</a:t>
-            </a:r>
-            <a:r>
               <a:rPr lang="pt-BR" dirty="0" smtClean="0"/>
-              <a:t>? Mário!</a:t>
+              <a:t>Sumário</a:t>
             </a:r>
             <a:endParaRPr lang="pt-BR" dirty="0"/>
           </a:p>
@@ -5057,14 +6900,56 @@
           <a:p>
             <a:r>
               <a:rPr lang="pt-BR" dirty="0" smtClean="0"/>
-              <a:t>Item 1</a:t>
+              <a:t>Escopo e Objetivos</a:t>
             </a:r>
           </a:p>
           <a:p>
             <a:r>
               <a:rPr lang="pt-BR" dirty="0" smtClean="0"/>
-              <a:t>Dois e três</a:t>
-            </a:r>
+              <a:t>Estrutura Organizacional</a:t>
+            </a:r>
+          </a:p>
+          <a:p>
+            <a:r>
+              <a:rPr lang="pt-BR" dirty="0" smtClean="0"/>
+              <a:t>Previsões</a:t>
+            </a:r>
+          </a:p>
+          <a:p>
+            <a:r>
+              <a:rPr lang="pt-BR" dirty="0" smtClean="0"/>
+              <a:t>Riscos</a:t>
+            </a:r>
+          </a:p>
+          <a:p>
+            <a:r>
+              <a:rPr lang="pt-BR" dirty="0" smtClean="0"/>
+              <a:t>Modelo de Processos</a:t>
+            </a:r>
+          </a:p>
+          <a:p>
+            <a:r>
+              <a:rPr lang="pt-BR" dirty="0" smtClean="0"/>
+              <a:t>Métodos, Ferramentas e Técnicas</a:t>
+            </a:r>
+          </a:p>
+          <a:p>
+            <a:r>
+              <a:rPr lang="pt-BR" dirty="0" smtClean="0"/>
+              <a:t>Gerenciamento de Configuração</a:t>
+            </a:r>
+          </a:p>
+          <a:p>
+            <a:endParaRPr lang="pt-BR" dirty="0" smtClean="0"/>
+          </a:p>
+          <a:p>
+            <a:endParaRPr lang="pt-BR" dirty="0" smtClean="0"/>
+          </a:p>
+          <a:p>
+            <a:endParaRPr lang="pt-BR" dirty="0" smtClean="0"/>
+          </a:p>
+          <a:p>
+            <a:endParaRPr lang="pt-BR" dirty="0" smtClean="0"/>
           </a:p>
           <a:p>
             <a:endParaRPr lang="pt-BR" dirty="0" err="1" smtClean="0"/>
@@ -5158,7 +7043,7 @@
             <a:pPr algn="just"/>
             <a:r>
               <a:rPr lang="pt-BR" dirty="0" smtClean="0"/>
-              <a:t>Análises podem ser feitas pelos usuários a partir dos dados gerados pela simulação</a:t>
+              <a:t>Análises podem ser feitas pelos usuários a partir dos dados gerados pela simulação:</a:t>
             </a:r>
           </a:p>
           <a:p>
@@ -5251,7 +7136,7 @@
           <a:p>
             <a:r>
               <a:rPr lang="pt-BR" dirty="0" smtClean="0"/>
-              <a:t>Entradas:</a:t>
+              <a:t>Entrada:</a:t>
             </a:r>
           </a:p>
           <a:p>
@@ -5324,6 +7209,13 @@
   <p:clrMapOvr>
     <a:masterClrMapping/>
   </p:clrMapOvr>
+  <p:timing>
+    <p:tnLst>
+      <p:par>
+        <p:cTn id="1" dur="indefinite" restart="never" nodeType="tmRoot"/>
+      </p:par>
+    </p:tnLst>
+  </p:timing>
 </p:sld>
 </file>
 
@@ -5410,6 +7302,13 @@
   <p:clrMapOvr>
     <a:masterClrMapping/>
   </p:clrMapOvr>
+  <p:timing>
+    <p:tnLst>
+      <p:par>
+        <p:cTn id="1" dur="indefinite" restart="never" nodeType="tmRoot"/>
+      </p:par>
+    </p:tnLst>
+  </p:timing>
 </p:sld>
 </file>
 
@@ -5468,19 +7367,21 @@
           <a:bodyPr/>
           <a:lstStyle/>
           <a:p>
+            <a:pPr algn="just"/>
             <a:r>
               <a:rPr lang="pt-BR" dirty="0" smtClean="0"/>
               <a:t>Modelo democrático</a:t>
             </a:r>
           </a:p>
           <a:p>
+            <a:pPr algn="just"/>
             <a:r>
               <a:rPr lang="pt-BR" dirty="0" smtClean="0"/>
               <a:t>Controle de Qualidade:</a:t>
             </a:r>
           </a:p>
           <a:p>
-            <a:pPr lvl="1"/>
+            <a:pPr lvl="1" algn="just"/>
             <a:r>
               <a:rPr lang="pt-BR" dirty="0" smtClean="0"/>
               <a:t>Professor Antônio Cláudio </a:t>
@@ -5493,7 +7394,13 @@
               <a:rPr lang="pt-BR" dirty="0" smtClean="0"/>
               <a:t> de Souza</a:t>
             </a:r>
-            <a:endParaRPr lang="pt-BR" dirty="0"/>
+          </a:p>
+          <a:p>
+            <a:pPr algn="just"/>
+            <a:r>
+              <a:rPr lang="pt-BR" dirty="0" smtClean="0"/>
+              <a:t>O Professor Paulo Cezar Martins Ribeiro, do PET, irá acompanhar o desenvolvimento da ferramenta</a:t>
+            </a:r>
           </a:p>
         </p:txBody>
       </p:sp>
@@ -5502,6 +7409,349 @@
   <p:clrMapOvr>
     <a:masterClrMapping/>
   </p:clrMapOvr>
+  <p:timing>
+    <p:tnLst>
+      <p:par>
+        <p:cTn id="1" dur="indefinite" restart="never" nodeType="tmRoot"/>
+      </p:par>
+    </p:tnLst>
+  </p:timing>
+</p:sld>
+</file>
+
+<file path=ppt/slides/slide7.xml><?xml version="1.0" encoding="utf-8"?>
+<p:sld xmlns:a="http://schemas.openxmlformats.org/drawingml/2006/main" xmlns:r="http://schemas.openxmlformats.org/officeDocument/2006/relationships" xmlns:p="http://schemas.openxmlformats.org/presentationml/2006/main">
+  <p:cSld>
+    <p:spTree>
+      <p:nvGrpSpPr>
+        <p:cNvPr id="1" name=""/>
+        <p:cNvGrpSpPr/>
+        <p:nvPr/>
+      </p:nvGrpSpPr>
+      <p:grpSpPr>
+        <a:xfrm>
+          <a:off x="0" y="0"/>
+          <a:ext cx="0" cy="0"/>
+          <a:chOff x="0" y="0"/>
+          <a:chExt cx="0" cy="0"/>
+        </a:xfrm>
+      </p:grpSpPr>
+      <p:sp>
+        <p:nvSpPr>
+          <p:cNvPr id="2" name="Título 1"/>
+          <p:cNvSpPr>
+            <a:spLocks noGrp="1"/>
+          </p:cNvSpPr>
+          <p:nvPr>
+            <p:ph type="title"/>
+          </p:nvPr>
+        </p:nvSpPr>
+        <p:spPr/>
+        <p:txBody>
+          <a:bodyPr/>
+          <a:lstStyle/>
+          <a:p>
+            <a:r>
+              <a:rPr lang="pt-BR" dirty="0" smtClean="0"/>
+              <a:t>Previsões</a:t>
+            </a:r>
+            <a:endParaRPr lang="pt-BR" dirty="0"/>
+          </a:p>
+        </p:txBody>
+      </p:sp>
+      <p:sp>
+        <p:nvSpPr>
+          <p:cNvPr id="3" name="Espaço Reservado para Conteúdo 2"/>
+          <p:cNvSpPr>
+            <a:spLocks noGrp="1"/>
+          </p:cNvSpPr>
+          <p:nvPr>
+            <p:ph idx="1"/>
+          </p:nvPr>
+        </p:nvSpPr>
+        <p:spPr/>
+        <p:txBody>
+          <a:bodyPr/>
+          <a:lstStyle/>
+          <a:p>
+            <a:pPr algn="just"/>
+            <a:r>
+              <a:rPr lang="pt-BR" dirty="0" smtClean="0"/>
+              <a:t>Previsões feitas com o software COCOMO II</a:t>
+            </a:r>
+          </a:p>
+          <a:p>
+            <a:pPr algn="just"/>
+            <a:r>
+              <a:rPr lang="pt-BR" dirty="0" smtClean="0"/>
+              <a:t>Foram usadas as seguintes entradas para o cálculo de Pontos de Função:</a:t>
+            </a:r>
+          </a:p>
+          <a:p>
+            <a:pPr lvl="1" algn="just"/>
+            <a:r>
+              <a:rPr lang="pt-BR" dirty="0" smtClean="0"/>
+              <a:t>Entradas: uma de complexidade alta</a:t>
+            </a:r>
+          </a:p>
+          <a:p>
+            <a:pPr lvl="1" algn="just"/>
+            <a:r>
+              <a:rPr lang="pt-BR" dirty="0" smtClean="0"/>
+              <a:t>Saídas: uma de complexidade baixa e uma de complexidade alta</a:t>
+            </a:r>
+          </a:p>
+          <a:p>
+            <a:pPr lvl="1" algn="just"/>
+            <a:r>
+              <a:rPr lang="pt-BR" dirty="0" smtClean="0"/>
+              <a:t>Interfaces: uma de complexidade baixa</a:t>
+            </a:r>
+          </a:p>
+          <a:p>
+            <a:pPr algn="just"/>
+            <a:r>
+              <a:rPr lang="pt-BR" dirty="0" smtClean="0"/>
+              <a:t>O resultado obtido foi de 22 pontos de função</a:t>
+            </a:r>
+            <a:endParaRPr lang="pt-BR" dirty="0"/>
+          </a:p>
+        </p:txBody>
+      </p:sp>
+    </p:spTree>
+  </p:cSld>
+  <p:clrMapOvr>
+    <a:masterClrMapping/>
+  </p:clrMapOvr>
+  <p:timing>
+    <p:tnLst>
+      <p:par>
+        <p:cTn id="1" dur="indefinite" restart="never" nodeType="tmRoot"/>
+      </p:par>
+    </p:tnLst>
+  </p:timing>
+</p:sld>
+</file>
+
+<file path=ppt/slides/slide8.xml><?xml version="1.0" encoding="utf-8"?>
+<p:sld xmlns:a="http://schemas.openxmlformats.org/drawingml/2006/main" xmlns:r="http://schemas.openxmlformats.org/officeDocument/2006/relationships" xmlns:p="http://schemas.openxmlformats.org/presentationml/2006/main">
+  <p:cSld>
+    <p:spTree>
+      <p:nvGrpSpPr>
+        <p:cNvPr id="1" name=""/>
+        <p:cNvGrpSpPr/>
+        <p:nvPr/>
+      </p:nvGrpSpPr>
+      <p:grpSpPr>
+        <a:xfrm>
+          <a:off x="0" y="0"/>
+          <a:ext cx="0" cy="0"/>
+          <a:chOff x="0" y="0"/>
+          <a:chExt cx="0" cy="0"/>
+        </a:xfrm>
+      </p:grpSpPr>
+      <p:sp>
+        <p:nvSpPr>
+          <p:cNvPr id="2" name="Título 1"/>
+          <p:cNvSpPr>
+            <a:spLocks noGrp="1"/>
+          </p:cNvSpPr>
+          <p:nvPr>
+            <p:ph type="title"/>
+          </p:nvPr>
+        </p:nvSpPr>
+        <p:spPr/>
+        <p:txBody>
+          <a:bodyPr/>
+          <a:lstStyle/>
+          <a:p>
+            <a:r>
+              <a:rPr lang="pt-BR" dirty="0" smtClean="0"/>
+              <a:t>Previsões</a:t>
+            </a:r>
+            <a:endParaRPr lang="pt-BR" dirty="0"/>
+          </a:p>
+        </p:txBody>
+      </p:sp>
+      <p:pic>
+        <p:nvPicPr>
+          <p:cNvPr id="4" name="Espaço Reservado para Conteúdo 3" descr="cocomo1.jpg"/>
+          <p:cNvPicPr>
+            <a:picLocks noGrp="1"/>
+          </p:cNvPicPr>
+          <p:nvPr>
+            <p:ph idx="1"/>
+          </p:nvPr>
+        </p:nvPicPr>
+        <p:blipFill>
+          <a:blip r:embed="rId3"/>
+          <a:stretch>
+            <a:fillRect/>
+          </a:stretch>
+        </p:blipFill>
+        <p:spPr>
+          <a:xfrm>
+            <a:off x="2500298" y="1509677"/>
+            <a:ext cx="4357718" cy="5134033"/>
+          </a:xfrm>
+          <a:prstGeom prst="rect">
+            <a:avLst/>
+          </a:prstGeom>
+        </p:spPr>
+      </p:pic>
+    </p:spTree>
+  </p:cSld>
+  <p:clrMapOvr>
+    <a:masterClrMapping/>
+  </p:clrMapOvr>
+  <p:timing>
+    <p:tnLst>
+      <p:par>
+        <p:cTn id="1" dur="indefinite" restart="never" nodeType="tmRoot"/>
+      </p:par>
+    </p:tnLst>
+  </p:timing>
+</p:sld>
+</file>
+
+<file path=ppt/slides/slide9.xml><?xml version="1.0" encoding="utf-8"?>
+<p:sld xmlns:a="http://schemas.openxmlformats.org/drawingml/2006/main" xmlns:r="http://schemas.openxmlformats.org/officeDocument/2006/relationships" xmlns:p="http://schemas.openxmlformats.org/presentationml/2006/main">
+  <p:cSld>
+    <p:spTree>
+      <p:nvGrpSpPr>
+        <p:cNvPr id="1" name=""/>
+        <p:cNvGrpSpPr/>
+        <p:nvPr/>
+      </p:nvGrpSpPr>
+      <p:grpSpPr>
+        <a:xfrm>
+          <a:off x="0" y="0"/>
+          <a:ext cx="0" cy="0"/>
+          <a:chOff x="0" y="0"/>
+          <a:chExt cx="0" cy="0"/>
+        </a:xfrm>
+      </p:grpSpPr>
+      <p:sp>
+        <p:nvSpPr>
+          <p:cNvPr id="2" name="Título 1"/>
+          <p:cNvSpPr>
+            <a:spLocks noGrp="1"/>
+          </p:cNvSpPr>
+          <p:nvPr>
+            <p:ph type="title"/>
+          </p:nvPr>
+        </p:nvSpPr>
+        <p:spPr/>
+        <p:txBody>
+          <a:bodyPr/>
+          <a:lstStyle/>
+          <a:p>
+            <a:r>
+              <a:rPr lang="pt-BR" dirty="0" smtClean="0"/>
+              <a:t>Previsões</a:t>
+            </a:r>
+            <a:endParaRPr lang="pt-BR" dirty="0"/>
+          </a:p>
+        </p:txBody>
+      </p:sp>
+      <p:sp>
+        <p:nvSpPr>
+          <p:cNvPr id="3" name="Espaço Reservado para Conteúdo 2"/>
+          <p:cNvSpPr>
+            <a:spLocks noGrp="1"/>
+          </p:cNvSpPr>
+          <p:nvPr>
+            <p:ph idx="1"/>
+          </p:nvPr>
+        </p:nvSpPr>
+        <p:spPr/>
+        <p:txBody>
+          <a:bodyPr/>
+          <a:lstStyle/>
+          <a:p>
+            <a:r>
+              <a:rPr lang="pt-BR" dirty="0" smtClean="0"/>
+              <a:t>Os seguintes dados foram previstos:</a:t>
+            </a:r>
+          </a:p>
+          <a:p>
+            <a:pPr lvl="1"/>
+            <a:r>
+              <a:rPr lang="pt-BR" dirty="0" smtClean="0"/>
+              <a:t>Esforço total regulado: 3,0 PM</a:t>
+            </a:r>
+          </a:p>
+          <a:p>
+            <a:pPr lvl="1"/>
+            <a:r>
+              <a:rPr lang="pt-BR" dirty="0" smtClean="0"/>
+              <a:t>S</a:t>
+            </a:r>
+            <a:r>
+              <a:rPr lang="pt-BR" dirty="0" smtClean="0"/>
+              <a:t>LOC: aprox. 2000 linhas de código</a:t>
+            </a:r>
+          </a:p>
+          <a:p>
+            <a:pPr lvl="1"/>
+            <a:r>
+              <a:rPr lang="pt-BR" dirty="0" smtClean="0"/>
+              <a:t>EAF (</a:t>
+            </a:r>
+            <a:r>
+              <a:rPr lang="pt-BR" i="1" dirty="0" err="1" smtClean="0"/>
+              <a:t>Effort</a:t>
+            </a:r>
+            <a:r>
+              <a:rPr lang="pt-BR" i="1" dirty="0" smtClean="0"/>
+              <a:t> </a:t>
+            </a:r>
+            <a:r>
+              <a:rPr lang="pt-BR" i="1" dirty="0" err="1" smtClean="0"/>
+              <a:t>Adjustment</a:t>
+            </a:r>
+            <a:r>
+              <a:rPr lang="pt-BR" i="1" dirty="0" smtClean="0"/>
+              <a:t> </a:t>
+            </a:r>
+            <a:r>
+              <a:rPr lang="pt-BR" i="1" dirty="0" err="1" smtClean="0"/>
+              <a:t>Factor</a:t>
+            </a:r>
+            <a:r>
+              <a:rPr lang="pt-BR" dirty="0" smtClean="0"/>
+              <a:t>): 0,55</a:t>
+            </a:r>
+          </a:p>
+          <a:p>
+            <a:pPr lvl="1"/>
+            <a:r>
+              <a:rPr lang="pt-BR" dirty="0" smtClean="0"/>
+              <a:t>Prazo: 3 meses</a:t>
+            </a:r>
+          </a:p>
+          <a:p>
+            <a:pPr lvl="1"/>
+            <a:r>
+              <a:rPr lang="pt-BR" dirty="0" smtClean="0"/>
+              <a:t>Custo do software: aprox. R$15.000,00</a:t>
+            </a:r>
+            <a:endParaRPr lang="pt-BR" dirty="0"/>
+          </a:p>
+        </p:txBody>
+      </p:sp>
+    </p:spTree>
+  </p:cSld>
+  <p:clrMapOvr>
+    <a:masterClrMapping/>
+  </p:clrMapOvr>
+  <p:timing>
+    <p:tnLst>
+      <p:par>
+        <p:cTn id="1" dur="indefinite" restart="never" nodeType="tmRoot"/>
+      </p:par>
+    </p:tnLst>
+  </p:timing>
 </p:sld>
 </file>
 

</xml_diff>